<commit_message>
Wired SQL Server to app through EF Core. Tried EF database migrations to see how it works.
</commit_message>
<xml_diff>
--- a/docs/Rest API using .Net Core 3.1.pptx
+++ b/docs/Rest API using .Net Core 3.1.pptx
@@ -10,8 +10,9 @@
     <p:sldId id="257" r:id="rId4"/>
     <p:sldId id="262" r:id="rId5"/>
     <p:sldId id="263" r:id="rId6"/>
-    <p:sldId id="260" r:id="rId7"/>
-    <p:sldId id="258" r:id="rId8"/>
+    <p:sldId id="264" r:id="rId7"/>
+    <p:sldId id="260" r:id="rId8"/>
+    <p:sldId id="258" r:id="rId9"/>
   </p:sldIdLst>
   <p:sldSz cx="12192000" cy="6858000"/>
   <p:notesSz cx="6858000" cy="9144000"/>
@@ -265,7 +266,7 @@
           <a:p>
             <a:fld id="{605E9D6F-DD27-48E8-B4A6-144BD91B9C7F}" type="datetimeFigureOut">
               <a:rPr lang="en-US" smtClean="0"/>
-              <a:t>9/19/2022</a:t>
+              <a:t>9/20/2022</a:t>
             </a:fld>
             <a:endParaRPr lang="en-US"/>
           </a:p>
@@ -463,7 +464,7 @@
           <a:p>
             <a:fld id="{605E9D6F-DD27-48E8-B4A6-144BD91B9C7F}" type="datetimeFigureOut">
               <a:rPr lang="en-US" smtClean="0"/>
-              <a:t>9/19/2022</a:t>
+              <a:t>9/20/2022</a:t>
             </a:fld>
             <a:endParaRPr lang="en-US"/>
           </a:p>
@@ -671,7 +672,7 @@
           <a:p>
             <a:fld id="{605E9D6F-DD27-48E8-B4A6-144BD91B9C7F}" type="datetimeFigureOut">
               <a:rPr lang="en-US" smtClean="0"/>
-              <a:t>9/19/2022</a:t>
+              <a:t>9/20/2022</a:t>
             </a:fld>
             <a:endParaRPr lang="en-US"/>
           </a:p>
@@ -869,7 +870,7 @@
           <a:p>
             <a:fld id="{605E9D6F-DD27-48E8-B4A6-144BD91B9C7F}" type="datetimeFigureOut">
               <a:rPr lang="en-US" smtClean="0"/>
-              <a:t>9/19/2022</a:t>
+              <a:t>9/20/2022</a:t>
             </a:fld>
             <a:endParaRPr lang="en-US"/>
           </a:p>
@@ -1144,7 +1145,7 @@
           <a:p>
             <a:fld id="{605E9D6F-DD27-48E8-B4A6-144BD91B9C7F}" type="datetimeFigureOut">
               <a:rPr lang="en-US" smtClean="0"/>
-              <a:t>9/19/2022</a:t>
+              <a:t>9/20/2022</a:t>
             </a:fld>
             <a:endParaRPr lang="en-US"/>
           </a:p>
@@ -1409,7 +1410,7 @@
           <a:p>
             <a:fld id="{605E9D6F-DD27-48E8-B4A6-144BD91B9C7F}" type="datetimeFigureOut">
               <a:rPr lang="en-US" smtClean="0"/>
-              <a:t>9/19/2022</a:t>
+              <a:t>9/20/2022</a:t>
             </a:fld>
             <a:endParaRPr lang="en-US"/>
           </a:p>
@@ -1821,7 +1822,7 @@
           <a:p>
             <a:fld id="{605E9D6F-DD27-48E8-B4A6-144BD91B9C7F}" type="datetimeFigureOut">
               <a:rPr lang="en-US" smtClean="0"/>
-              <a:t>9/19/2022</a:t>
+              <a:t>9/20/2022</a:t>
             </a:fld>
             <a:endParaRPr lang="en-US"/>
           </a:p>
@@ -1962,7 +1963,7 @@
           <a:p>
             <a:fld id="{605E9D6F-DD27-48E8-B4A6-144BD91B9C7F}" type="datetimeFigureOut">
               <a:rPr lang="en-US" smtClean="0"/>
-              <a:t>9/19/2022</a:t>
+              <a:t>9/20/2022</a:t>
             </a:fld>
             <a:endParaRPr lang="en-US"/>
           </a:p>
@@ -2075,7 +2076,7 @@
           <a:p>
             <a:fld id="{605E9D6F-DD27-48E8-B4A6-144BD91B9C7F}" type="datetimeFigureOut">
               <a:rPr lang="en-US" smtClean="0"/>
-              <a:t>9/19/2022</a:t>
+              <a:t>9/20/2022</a:t>
             </a:fld>
             <a:endParaRPr lang="en-US"/>
           </a:p>
@@ -2386,7 +2387,7 @@
           <a:p>
             <a:fld id="{605E9D6F-DD27-48E8-B4A6-144BD91B9C7F}" type="datetimeFigureOut">
               <a:rPr lang="en-US" smtClean="0"/>
-              <a:t>9/19/2022</a:t>
+              <a:t>9/20/2022</a:t>
             </a:fld>
             <a:endParaRPr lang="en-US"/>
           </a:p>
@@ -2674,7 +2675,7 @@
           <a:p>
             <a:fld id="{605E9D6F-DD27-48E8-B4A6-144BD91B9C7F}" type="datetimeFigureOut">
               <a:rPr lang="en-US" smtClean="0"/>
-              <a:t>9/19/2022</a:t>
+              <a:t>9/20/2022</a:t>
             </a:fld>
             <a:endParaRPr lang="en-US"/>
           </a:p>
@@ -2915,7 +2916,7 @@
           <a:p>
             <a:fld id="{605E9D6F-DD27-48E8-B4A6-144BD91B9C7F}" type="datetimeFigureOut">
               <a:rPr lang="en-US" smtClean="0"/>
-              <a:t>9/19/2022</a:t>
+              <a:t>9/20/2022</a:t>
             </a:fld>
             <a:endParaRPr lang="en-US"/>
           </a:p>
@@ -3980,10 +3981,10 @@
       </p:grpSpPr>
       <p:sp>
         <p:nvSpPr>
-          <p:cNvPr id="3" name="TextBox 2">
-            <a:extLst>
-              <a:ext uri="{FF2B5EF4-FFF2-40B4-BE49-F238E27FC236}">
-                <a16:creationId xmlns:a16="http://schemas.microsoft.com/office/drawing/2014/main" id="{52F8B9B6-1779-AE32-DA41-7B7F606DA714}"/>
+          <p:cNvPr id="2" name="TextBox 1">
+            <a:extLst>
+              <a:ext uri="{FF2B5EF4-FFF2-40B4-BE49-F238E27FC236}">
+                <a16:creationId xmlns:a16="http://schemas.microsoft.com/office/drawing/2014/main" id="{F81C0503-50FF-D1F0-CFB9-AD6DD8F08FB3}"/>
               </a:ext>
             </a:extLst>
           </p:cNvPr>
@@ -3992,8 +3993,8 @@
         </p:nvSpPr>
         <p:spPr>
           <a:xfrm>
-            <a:off x="304800" y="296333"/>
-            <a:ext cx="11667067" cy="3139321"/>
+            <a:off x="349718" y="336884"/>
+            <a:ext cx="11492564" cy="7017306"/>
           </a:xfrm>
           <a:prstGeom prst="rect">
             <a:avLst/>
@@ -4008,7 +4009,407 @@
           <a:p>
             <a:r>
               <a:rPr lang="en-US" dirty="0"/>
-              <a:t>Notes:</a:t>
+              <a:t>Entity Framework:</a:t>
+            </a:r>
+          </a:p>
+          <a:p>
+            <a:endParaRPr lang="en-US" dirty="0"/>
+          </a:p>
+          <a:p>
+            <a:endParaRPr lang="en-US" dirty="0"/>
+          </a:p>
+          <a:p>
+            <a:r>
+              <a:rPr lang="en-US" dirty="0"/>
+              <a:t>Packages </a:t>
+            </a:r>
+            <a:r>
+              <a:rPr lang="en-US" dirty="0" err="1"/>
+              <a:t>Requied</a:t>
+            </a:r>
+            <a:r>
+              <a:rPr lang="en-US" dirty="0"/>
+              <a:t>:</a:t>
+            </a:r>
+          </a:p>
+          <a:p>
+            <a:endParaRPr lang="en-US" dirty="0"/>
+          </a:p>
+          <a:p>
+            <a:r>
+              <a:rPr lang="en-US" dirty="0"/>
+              <a:t>	</a:t>
+            </a:r>
+            <a:r>
+              <a:rPr lang="en-US" dirty="0" err="1"/>
+              <a:t>EntityFrameworkCore</a:t>
+            </a:r>
+            <a:endParaRPr lang="en-US" dirty="0"/>
+          </a:p>
+          <a:p>
+            <a:r>
+              <a:rPr lang="en-US" dirty="0"/>
+              <a:t>	</a:t>
+            </a:r>
+            <a:r>
+              <a:rPr lang="en-US" dirty="0" err="1"/>
+              <a:t>EntityFrameworkCore.Design</a:t>
+            </a:r>
+            <a:endParaRPr lang="en-US" dirty="0"/>
+          </a:p>
+          <a:p>
+            <a:r>
+              <a:rPr lang="en-US" dirty="0"/>
+              <a:t>	</a:t>
+            </a:r>
+            <a:r>
+              <a:rPr lang="en-US" dirty="0" err="1"/>
+              <a:t>EntityFrameworkCore.SqlServer</a:t>
+            </a:r>
+            <a:endParaRPr lang="en-US" dirty="0"/>
+          </a:p>
+          <a:p>
+            <a:r>
+              <a:rPr lang="en-US" dirty="0"/>
+              <a:t>	</a:t>
+            </a:r>
+          </a:p>
+          <a:p>
+            <a:r>
+              <a:rPr lang="en-US" dirty="0"/>
+              <a:t>	dotnet </a:t>
+            </a:r>
+            <a:r>
+              <a:rPr lang="en-US" dirty="0" err="1"/>
+              <a:t>ef</a:t>
+            </a:r>
+            <a:r>
+              <a:rPr lang="en-US" dirty="0"/>
+              <a:t> =&gt; </a:t>
+            </a:r>
+            <a:r>
+              <a:rPr lang="en-US" dirty="0" err="1"/>
+              <a:t>ef</a:t>
+            </a:r>
+            <a:r>
+              <a:rPr lang="en-US" dirty="0"/>
+              <a:t> : entity framework command line tool for dotnet.</a:t>
+            </a:r>
+          </a:p>
+          <a:p>
+            <a:r>
+              <a:rPr lang="en-US" dirty="0"/>
+              <a:t>	dotnet </a:t>
+            </a:r>
+            <a:r>
+              <a:rPr lang="en-US" dirty="0" err="1"/>
+              <a:t>ef</a:t>
+            </a:r>
+            <a:r>
+              <a:rPr lang="en-US" dirty="0"/>
+              <a:t> [database | </a:t>
+            </a:r>
+            <a:r>
+              <a:rPr lang="en-US" dirty="0" err="1"/>
+              <a:t>dbContext</a:t>
+            </a:r>
+            <a:r>
+              <a:rPr lang="en-US" dirty="0"/>
+              <a:t> | migration] </a:t>
+            </a:r>
+          </a:p>
+          <a:p>
+            <a:endParaRPr lang="en-US" dirty="0"/>
+          </a:p>
+          <a:p>
+            <a:endParaRPr lang="en-US" dirty="0"/>
+          </a:p>
+          <a:p>
+            <a:r>
+              <a:rPr lang="en-US" dirty="0"/>
+              <a:t>SQL Server:</a:t>
+            </a:r>
+          </a:p>
+          <a:p>
+            <a:endParaRPr lang="en-US" dirty="0"/>
+          </a:p>
+          <a:p>
+            <a:r>
+              <a:rPr lang="en-US" dirty="0"/>
+              <a:t>Install </a:t>
+            </a:r>
+            <a:r>
+              <a:rPr lang="en-US" dirty="0" err="1"/>
+              <a:t>Sql</a:t>
+            </a:r>
+            <a:r>
+              <a:rPr lang="en-US" dirty="0"/>
+              <a:t> Server</a:t>
+            </a:r>
+          </a:p>
+          <a:p>
+            <a:r>
+              <a:rPr lang="en-US" dirty="0"/>
+              <a:t>Install SQL Management Studio</a:t>
+            </a:r>
+          </a:p>
+          <a:p>
+            <a:r>
+              <a:rPr lang="en-US" dirty="0"/>
+              <a:t>Create a </a:t>
+            </a:r>
+            <a:r>
+              <a:rPr lang="en-US" dirty="0" err="1"/>
+              <a:t>Sql</a:t>
+            </a:r>
+            <a:r>
+              <a:rPr lang="en-US" dirty="0"/>
+              <a:t> authenticated login</a:t>
+            </a:r>
+          </a:p>
+          <a:p>
+            <a:endParaRPr lang="en-US" dirty="0"/>
+          </a:p>
+          <a:p>
+            <a:r>
+              <a:rPr lang="en-US" dirty="0"/>
+              <a:t>Add connection string to the app:</a:t>
+            </a:r>
+            <a:r>
+              <a:rPr lang="en-US" b="0" dirty="0">
+                <a:solidFill>
+                  <a:srgbClr val="CE9178"/>
+                </a:solidFill>
+                <a:effectLst/>
+                <a:latin typeface="Consolas" panose="020B0609020204030204" pitchFamily="49" charset="0"/>
+              </a:rPr>
+              <a:t> Server=CHE-LT-I45247A – host name; </a:t>
+            </a:r>
+            <a:r>
+              <a:rPr lang="en-US" b="0" dirty="0" err="1">
+                <a:solidFill>
+                  <a:srgbClr val="CE9178"/>
+                </a:solidFill>
+                <a:effectLst/>
+                <a:latin typeface="Consolas" panose="020B0609020204030204" pitchFamily="49" charset="0"/>
+              </a:rPr>
+              <a:t>InitialCatalog</a:t>
+            </a:r>
+            <a:r>
+              <a:rPr lang="en-US" b="0" dirty="0">
+                <a:solidFill>
+                  <a:srgbClr val="CE9178"/>
+                </a:solidFill>
+                <a:effectLst/>
+                <a:latin typeface="Consolas" panose="020B0609020204030204" pitchFamily="49" charset="0"/>
+              </a:rPr>
+              <a:t> = </a:t>
+            </a:r>
+            <a:r>
+              <a:rPr lang="en-US" b="0">
+                <a:solidFill>
+                  <a:srgbClr val="CE9178"/>
+                </a:solidFill>
+                <a:effectLst/>
+                <a:latin typeface="Consolas" panose="020B0609020204030204" pitchFamily="49" charset="0"/>
+              </a:rPr>
+              <a:t>Database name</a:t>
+            </a:r>
+            <a:endParaRPr lang="en-US" dirty="0"/>
+          </a:p>
+          <a:p>
+            <a:r>
+              <a:rPr lang="en-US" b="0" dirty="0">
+                <a:solidFill>
+                  <a:srgbClr val="D4D4D4"/>
+                </a:solidFill>
+                <a:effectLst/>
+                <a:latin typeface="Consolas" panose="020B0609020204030204" pitchFamily="49" charset="0"/>
+              </a:rPr>
+              <a:t> </a:t>
+            </a:r>
+            <a:r>
+              <a:rPr lang="en-US" b="0" dirty="0">
+                <a:solidFill>
+                  <a:srgbClr val="9CDCFE"/>
+                </a:solidFill>
+                <a:effectLst/>
+                <a:latin typeface="Consolas" panose="020B0609020204030204" pitchFamily="49" charset="0"/>
+              </a:rPr>
+              <a:t>"</a:t>
+            </a:r>
+            <a:r>
+              <a:rPr lang="en-US" b="0" dirty="0" err="1">
+                <a:solidFill>
+                  <a:srgbClr val="9CDCFE"/>
+                </a:solidFill>
+                <a:effectLst/>
+                <a:latin typeface="Consolas" panose="020B0609020204030204" pitchFamily="49" charset="0"/>
+              </a:rPr>
+              <a:t>myCmdServerConn</a:t>
+            </a:r>
+            <a:r>
+              <a:rPr lang="en-US" b="0" dirty="0">
+                <a:solidFill>
+                  <a:srgbClr val="9CDCFE"/>
+                </a:solidFill>
+                <a:effectLst/>
+                <a:latin typeface="Consolas" panose="020B0609020204030204" pitchFamily="49" charset="0"/>
+              </a:rPr>
+              <a:t>"</a:t>
+            </a:r>
+            <a:r>
+              <a:rPr lang="en-US" b="0" dirty="0">
+                <a:solidFill>
+                  <a:srgbClr val="D4D4D4"/>
+                </a:solidFill>
+                <a:effectLst/>
+                <a:latin typeface="Consolas" panose="020B0609020204030204" pitchFamily="49" charset="0"/>
+              </a:rPr>
+              <a:t>:</a:t>
+            </a:r>
+            <a:r>
+              <a:rPr lang="en-US" b="0" dirty="0">
+                <a:solidFill>
+                  <a:srgbClr val="CE9178"/>
+                </a:solidFill>
+                <a:effectLst/>
+                <a:latin typeface="Consolas" panose="020B0609020204030204" pitchFamily="49" charset="0"/>
+              </a:rPr>
+              <a:t>"Server=CHE-LT-I45247A;Initial Catalog=</a:t>
+            </a:r>
+            <a:r>
+              <a:rPr lang="en-US" b="0" dirty="0" err="1">
+                <a:solidFill>
+                  <a:srgbClr val="CE9178"/>
+                </a:solidFill>
+                <a:effectLst/>
+                <a:latin typeface="Consolas" panose="020B0609020204030204" pitchFamily="49" charset="0"/>
+              </a:rPr>
+              <a:t>myCmdsDb</a:t>
+            </a:r>
+            <a:r>
+              <a:rPr lang="en-US" b="0" dirty="0">
+                <a:solidFill>
+                  <a:srgbClr val="CE9178"/>
+                </a:solidFill>
+                <a:effectLst/>
+                <a:latin typeface="Consolas" panose="020B0609020204030204" pitchFamily="49" charset="0"/>
+              </a:rPr>
+              <a:t>; User ID=</a:t>
+            </a:r>
+            <a:r>
+              <a:rPr lang="en-US" b="0" dirty="0" err="1">
+                <a:solidFill>
+                  <a:srgbClr val="CE9178"/>
+                </a:solidFill>
+                <a:effectLst/>
+                <a:latin typeface="Consolas" panose="020B0609020204030204" pitchFamily="49" charset="0"/>
+              </a:rPr>
+              <a:t>myCmdDb;Password</a:t>
+            </a:r>
+            <a:r>
+              <a:rPr lang="en-US" b="0" dirty="0">
+                <a:solidFill>
+                  <a:srgbClr val="CE9178"/>
+                </a:solidFill>
+                <a:effectLst/>
+                <a:latin typeface="Consolas" panose="020B0609020204030204" pitchFamily="49" charset="0"/>
+              </a:rPr>
+              <a:t>=Administrator123!;"</a:t>
+            </a:r>
+            <a:endParaRPr lang="en-US" b="0" dirty="0">
+              <a:solidFill>
+                <a:srgbClr val="D4D4D4"/>
+              </a:solidFill>
+              <a:effectLst/>
+              <a:latin typeface="Consolas" panose="020B0609020204030204" pitchFamily="49" charset="0"/>
+            </a:endParaRPr>
+          </a:p>
+          <a:p>
+            <a:endParaRPr lang="en-US" dirty="0"/>
+          </a:p>
+          <a:p>
+            <a:r>
+              <a:rPr lang="en-US" dirty="0"/>
+              <a:t> 	</a:t>
+            </a:r>
+          </a:p>
+        </p:txBody>
+      </p:sp>
+    </p:spTree>
+    <p:extLst>
+      <p:ext uri="{BB962C8B-B14F-4D97-AF65-F5344CB8AC3E}">
+        <p14:creationId xmlns:p14="http://schemas.microsoft.com/office/powerpoint/2010/main" val="4067587157"/>
+      </p:ext>
+    </p:extLst>
+  </p:cSld>
+  <p:clrMapOvr>
+    <a:masterClrMapping/>
+  </p:clrMapOvr>
+</p:sld>
+</file>
+
+<file path=ppt/slides/slide7.xml><?xml version="1.0" encoding="utf-8"?>
+<p:sld xmlns:a="http://schemas.openxmlformats.org/drawingml/2006/main" xmlns:r="http://schemas.openxmlformats.org/officeDocument/2006/relationships" xmlns:p="http://schemas.openxmlformats.org/presentationml/2006/main">
+  <p:cSld>
+    <p:spTree>
+      <p:nvGrpSpPr>
+        <p:cNvPr id="1" name=""/>
+        <p:cNvGrpSpPr/>
+        <p:nvPr/>
+      </p:nvGrpSpPr>
+      <p:grpSpPr>
+        <a:xfrm>
+          <a:off x="0" y="0"/>
+          <a:ext cx="0" cy="0"/>
+          <a:chOff x="0" y="0"/>
+          <a:chExt cx="0" cy="0"/>
+        </a:xfrm>
+      </p:grpSpPr>
+      <p:sp>
+        <p:nvSpPr>
+          <p:cNvPr id="3" name="TextBox 2">
+            <a:extLst>
+              <a:ext uri="{FF2B5EF4-FFF2-40B4-BE49-F238E27FC236}">
+                <a16:creationId xmlns:a16="http://schemas.microsoft.com/office/drawing/2014/main" id="{52F8B9B6-1779-AE32-DA41-7B7F606DA714}"/>
+              </a:ext>
+            </a:extLst>
+          </p:cNvPr>
+          <p:cNvSpPr txBox="1"/>
+          <p:nvPr/>
+        </p:nvSpPr>
+        <p:spPr>
+          <a:xfrm>
+            <a:off x="304800" y="296333"/>
+            <a:ext cx="11667067" cy="4247317"/>
+          </a:xfrm>
+          <a:prstGeom prst="rect">
+            <a:avLst/>
+          </a:prstGeom>
+          <a:noFill/>
+        </p:spPr>
+        <p:txBody>
+          <a:bodyPr wrap="square" rtlCol="0">
+            <a:spAutoFit/>
+          </a:bodyPr>
+          <a:lstStyle/>
+          <a:p>
+            <a:endParaRPr lang="en-US" dirty="0"/>
+          </a:p>
+          <a:p>
+            <a:r>
+              <a:rPr lang="en-US" dirty="0"/>
+              <a:t>1) How a controller deals with data?</a:t>
+            </a:r>
+          </a:p>
+          <a:p>
+            <a:endParaRPr lang="en-US" dirty="0"/>
+          </a:p>
+          <a:p>
+            <a:r>
+              <a:rPr lang="en-US" dirty="0"/>
+              <a:t>Controller gets the data it deals from repository.</a:t>
             </a:r>
           </a:p>
           <a:p>
@@ -4021,7 +4422,7 @@
             </a:pPr>
             <a:r>
               <a:rPr lang="en-US" dirty="0"/>
-              <a:t>Repo can be for all resources. </a:t>
+              <a:t>Repo(repository interface) can be for all resources. </a:t>
             </a:r>
             <a:r>
               <a:rPr lang="en-US" dirty="0" err="1"/>
@@ -4104,13 +4505,9 @@
             <a:endParaRPr lang="en-US" dirty="0"/>
           </a:p>
           <a:p>
-            <a:pPr marL="285750" indent="-285750">
-              <a:buFontTx/>
-              <a:buChar char="-"/>
-            </a:pPr>
-            <a:r>
-              <a:rPr lang="en-US" dirty="0"/>
-              <a:t>Why Action/API Endpoint method returns </a:t>
+            <a:r>
+              <a:rPr lang="en-US" dirty="0"/>
+              <a:t>2) Why Action/API Endpoint method returns </a:t>
             </a:r>
             <a:r>
               <a:rPr lang="en-US" dirty="0" err="1"/>
@@ -4120,6 +4517,9 @@
               <a:rPr lang="en-US" dirty="0"/>
               <a:t> not the object directly?</a:t>
             </a:r>
+          </a:p>
+          <a:p>
+            <a:endParaRPr lang="en-US" dirty="0"/>
           </a:p>
           <a:p>
             <a:endParaRPr lang="en-US" dirty="0"/>
@@ -4139,7 +4539,7 @@
 </p:sld>
 </file>
 
-<file path=ppt/slides/slide7.xml><?xml version="1.0" encoding="utf-8"?>
+<file path=ppt/slides/slide8.xml><?xml version="1.0" encoding="utf-8"?>
 <p:sld xmlns:a="http://schemas.openxmlformats.org/drawingml/2006/main" xmlns:r="http://schemas.openxmlformats.org/officeDocument/2006/relationships" xmlns:p="http://schemas.openxmlformats.org/presentationml/2006/main">
   <p:cSld>
     <p:spTree>

</xml_diff>

<commit_message>
DTO implementation using Automapper.
</commit_message>
<xml_diff>
--- a/docs/Rest API using .Net Core 3.1.pptx
+++ b/docs/Rest API using .Net Core 3.1.pptx
@@ -11,8 +11,10 @@
     <p:sldId id="262" r:id="rId5"/>
     <p:sldId id="263" r:id="rId6"/>
     <p:sldId id="264" r:id="rId7"/>
-    <p:sldId id="260" r:id="rId8"/>
-    <p:sldId id="258" r:id="rId9"/>
+    <p:sldId id="265" r:id="rId8"/>
+    <p:sldId id="266" r:id="rId9"/>
+    <p:sldId id="260" r:id="rId10"/>
+    <p:sldId id="258" r:id="rId11"/>
   </p:sldIdLst>
   <p:sldSz cx="12192000" cy="6858000"/>
   <p:notesSz cx="6858000" cy="9144000"/>
@@ -3403,6 +3405,187 @@
 </p:sld>
 </file>
 
+<file path=ppt/slides/slide10.xml><?xml version="1.0" encoding="utf-8"?>
+<p:sld xmlns:a="http://schemas.openxmlformats.org/drawingml/2006/main" xmlns:r="http://schemas.openxmlformats.org/officeDocument/2006/relationships" xmlns:p="http://schemas.openxmlformats.org/presentationml/2006/main">
+  <p:cSld>
+    <p:spTree>
+      <p:nvGrpSpPr>
+        <p:cNvPr id="1" name=""/>
+        <p:cNvGrpSpPr/>
+        <p:nvPr/>
+      </p:nvGrpSpPr>
+      <p:grpSpPr>
+        <a:xfrm>
+          <a:off x="0" y="0"/>
+          <a:ext cx="0" cy="0"/>
+          <a:chOff x="0" y="0"/>
+          <a:chExt cx="0" cy="0"/>
+        </a:xfrm>
+      </p:grpSpPr>
+      <p:sp>
+        <p:nvSpPr>
+          <p:cNvPr id="2" name="Title 1">
+            <a:extLst>
+              <a:ext uri="{FF2B5EF4-FFF2-40B4-BE49-F238E27FC236}">
+                <a16:creationId xmlns:a16="http://schemas.microsoft.com/office/drawing/2014/main" id="{7E26196B-6402-0E4D-8DED-007E9EAE3FD8}"/>
+              </a:ext>
+            </a:extLst>
+          </p:cNvPr>
+          <p:cNvSpPr>
+            <a:spLocks noGrp="1"/>
+          </p:cNvSpPr>
+          <p:nvPr>
+            <p:ph type="title"/>
+          </p:nvPr>
+        </p:nvSpPr>
+        <p:spPr>
+          <a:xfrm>
+            <a:off x="838200" y="154005"/>
+            <a:ext cx="10515600" cy="760396"/>
+          </a:xfrm>
+        </p:spPr>
+        <p:txBody>
+          <a:bodyPr>
+            <a:normAutofit/>
+          </a:bodyPr>
+          <a:lstStyle/>
+          <a:p>
+            <a:r>
+              <a:rPr lang="en-US" dirty="0"/>
+              <a:t>Create project vs code </a:t>
+            </a:r>
+            <a:r>
+              <a:rPr lang="en-US" dirty="0" err="1"/>
+              <a:t>Cmdj</a:t>
+            </a:r>
+            <a:endParaRPr lang="en-US" dirty="0"/>
+          </a:p>
+        </p:txBody>
+      </p:sp>
+      <p:sp>
+        <p:nvSpPr>
+          <p:cNvPr id="3" name="Content Placeholder 2">
+            <a:extLst>
+              <a:ext uri="{FF2B5EF4-FFF2-40B4-BE49-F238E27FC236}">
+                <a16:creationId xmlns:a16="http://schemas.microsoft.com/office/drawing/2014/main" id="{2F6146CC-94B4-88A0-BF12-87FF6547995E}"/>
+              </a:ext>
+            </a:extLst>
+          </p:cNvPr>
+          <p:cNvSpPr>
+            <a:spLocks noGrp="1"/>
+          </p:cNvSpPr>
+          <p:nvPr>
+            <p:ph idx="1"/>
+          </p:nvPr>
+        </p:nvSpPr>
+        <p:spPr>
+          <a:xfrm>
+            <a:off x="838200" y="991402"/>
+            <a:ext cx="10515600" cy="5185561"/>
+          </a:xfrm>
+        </p:spPr>
+        <p:txBody>
+          <a:bodyPr/>
+          <a:lstStyle/>
+          <a:p>
+            <a:pPr marL="0" indent="0">
+              <a:buNone/>
+            </a:pPr>
+            <a:r>
+              <a:rPr lang="en-US" dirty="0" err="1"/>
+              <a:t>Cmds</a:t>
+            </a:r>
+            <a:r>
+              <a:rPr lang="en-US" dirty="0"/>
+              <a:t>:</a:t>
+            </a:r>
+          </a:p>
+          <a:p>
+            <a:pPr marL="0" indent="0">
+              <a:buNone/>
+            </a:pPr>
+            <a:endParaRPr lang="en-US" dirty="0"/>
+          </a:p>
+          <a:p>
+            <a:pPr marL="0" indent="0">
+              <a:buNone/>
+            </a:pPr>
+            <a:r>
+              <a:rPr lang="en-US" dirty="0"/>
+              <a:t>Dotnet new</a:t>
+            </a:r>
+          </a:p>
+          <a:p>
+            <a:pPr marL="0" indent="0">
+              <a:buNone/>
+            </a:pPr>
+            <a:r>
+              <a:rPr lang="en-US" dirty="0"/>
+              <a:t>Dotnet new </a:t>
+            </a:r>
+            <a:r>
+              <a:rPr lang="en-US" dirty="0" err="1"/>
+              <a:t>webapi</a:t>
+            </a:r>
+            <a:r>
+              <a:rPr lang="en-US" dirty="0"/>
+              <a:t> –n </a:t>
+            </a:r>
+            <a:r>
+              <a:rPr lang="en-US" dirty="0" err="1"/>
+              <a:t>commandServer</a:t>
+            </a:r>
+            <a:r>
+              <a:rPr lang="en-US" dirty="0"/>
+              <a:t> (name of project)</a:t>
+            </a:r>
+          </a:p>
+          <a:p>
+            <a:pPr marL="0" indent="0">
+              <a:buNone/>
+            </a:pPr>
+            <a:endParaRPr lang="en-US" dirty="0"/>
+          </a:p>
+          <a:p>
+            <a:pPr marL="0" indent="0">
+              <a:buNone/>
+            </a:pPr>
+            <a:r>
+              <a:rPr lang="en-US" dirty="0"/>
+              <a:t>Core –r </a:t>
+            </a:r>
+            <a:r>
+              <a:rPr lang="en-US" dirty="0" err="1"/>
+              <a:t>commandServer</a:t>
+            </a:r>
+            <a:r>
+              <a:rPr lang="en-US" dirty="0"/>
+              <a:t> – open folder in </a:t>
+            </a:r>
+            <a:r>
+              <a:rPr lang="en-US" dirty="0" err="1"/>
+              <a:t>vscode</a:t>
+            </a:r>
+            <a:r>
+              <a:rPr lang="en-US" dirty="0"/>
+              <a:t> ?</a:t>
+            </a:r>
+          </a:p>
+        </p:txBody>
+      </p:sp>
+    </p:spTree>
+    <p:extLst>
+      <p:ext uri="{BB962C8B-B14F-4D97-AF65-F5344CB8AC3E}">
+        <p14:creationId xmlns:p14="http://schemas.microsoft.com/office/powerpoint/2010/main" val="177991174"/>
+      </p:ext>
+    </p:extLst>
+  </p:cSld>
+  <p:clrMapOvr>
+    <a:masterClrMapping/>
+  </p:clrMapOvr>
+</p:sld>
+</file>
+
 <file path=ppt/slides/slide2.xml><?xml version="1.0" encoding="utf-8"?>
 <p:sld xmlns:a="http://schemas.openxmlformats.org/drawingml/2006/main" xmlns:r="http://schemas.openxmlformats.org/officeDocument/2006/relationships" xmlns:p="http://schemas.openxmlformats.org/presentationml/2006/main">
   <p:cSld>
@@ -4369,10 +4552,10 @@
       </p:grpSpPr>
       <p:sp>
         <p:nvSpPr>
-          <p:cNvPr id="3" name="TextBox 2">
-            <a:extLst>
-              <a:ext uri="{FF2B5EF4-FFF2-40B4-BE49-F238E27FC236}">
-                <a16:creationId xmlns:a16="http://schemas.microsoft.com/office/drawing/2014/main" id="{52F8B9B6-1779-AE32-DA41-7B7F606DA714}"/>
+          <p:cNvPr id="2" name="TextBox 1">
+            <a:extLst>
+              <a:ext uri="{FF2B5EF4-FFF2-40B4-BE49-F238E27FC236}">
+                <a16:creationId xmlns:a16="http://schemas.microsoft.com/office/drawing/2014/main" id="{79879BB5-907B-6D20-2406-F5A67EBC6649}"/>
               </a:ext>
             </a:extLst>
           </p:cNvPr>
@@ -4381,8 +4564,8 @@
         </p:nvSpPr>
         <p:spPr>
           <a:xfrm>
-            <a:off x="304800" y="296333"/>
-            <a:ext cx="11667067" cy="4247317"/>
+            <a:off x="160867" y="262467"/>
+            <a:ext cx="11633200" cy="923330"/>
           </a:xfrm>
           <a:prstGeom prst="rect">
             <a:avLst/>
@@ -4395,141 +4578,275 @@
           </a:bodyPr>
           <a:lstStyle/>
           <a:p>
+            <a:r>
+              <a:rPr lang="en-US" dirty="0"/>
+              <a:t>DTO – What and Why</a:t>
+            </a:r>
+          </a:p>
+          <a:p>
             <a:endParaRPr lang="en-US" dirty="0"/>
           </a:p>
           <a:p>
-            <a:r>
-              <a:rPr lang="en-US" dirty="0"/>
-              <a:t>1) How a controller deals with data?</a:t>
-            </a:r>
-          </a:p>
-          <a:p>
             <a:endParaRPr lang="en-US" dirty="0"/>
           </a:p>
-          <a:p>
-            <a:r>
-              <a:rPr lang="en-US" dirty="0"/>
-              <a:t>Controller gets the data it deals from repository.</a:t>
-            </a:r>
-          </a:p>
-          <a:p>
-            <a:endParaRPr lang="en-US" dirty="0"/>
-          </a:p>
-          <a:p>
-            <a:pPr marL="285750" indent="-285750">
-              <a:buFontTx/>
-              <a:buChar char="-"/>
-            </a:pPr>
-            <a:r>
-              <a:rPr lang="en-US" dirty="0"/>
-              <a:t>Repo(repository interface) can be for all resources. </a:t>
-            </a:r>
-            <a:r>
-              <a:rPr lang="en-US" dirty="0" err="1"/>
-              <a:t>i.e</a:t>
-            </a:r>
-            <a:r>
-              <a:rPr lang="en-US" dirty="0"/>
-              <a:t>, A Repo can return commands as well any other data the underlying data base supports.</a:t>
-            </a:r>
-          </a:p>
-          <a:p>
-            <a:pPr marL="285750" indent="-285750">
-              <a:buFontTx/>
-              <a:buChar char="-"/>
-            </a:pPr>
-            <a:r>
-              <a:rPr lang="en-US" dirty="0"/>
-              <a:t>Controller – can deal with one resource type. </a:t>
-            </a:r>
-            <a:r>
-              <a:rPr lang="en-US" dirty="0" err="1"/>
-              <a:t>i.e</a:t>
-            </a:r>
-            <a:r>
-              <a:rPr lang="en-US" dirty="0"/>
-              <a:t>, </a:t>
-            </a:r>
-            <a:r>
-              <a:rPr lang="en-US" dirty="0" err="1"/>
-              <a:t>Cmd</a:t>
-            </a:r>
-            <a:r>
-              <a:rPr lang="en-US" dirty="0"/>
-              <a:t> Controller can do CRUD operation on Cmd.</a:t>
-            </a:r>
-          </a:p>
-          <a:p>
-            <a:r>
-              <a:rPr lang="en-US" dirty="0" err="1"/>
-              <a:t>UserController</a:t>
-            </a:r>
-            <a:r>
-              <a:rPr lang="en-US" dirty="0"/>
-              <a:t> – can do CRUD Operation on User entity. </a:t>
-            </a:r>
-            <a:r>
-              <a:rPr lang="en-US" dirty="0" err="1"/>
-              <a:t>i.e</a:t>
-            </a:r>
-            <a:r>
-              <a:rPr lang="en-US" dirty="0"/>
-              <a:t>, </a:t>
-            </a:r>
-            <a:r>
-              <a:rPr lang="en-US" dirty="0" err="1"/>
-              <a:t>CmdController</a:t>
-            </a:r>
-            <a:r>
-              <a:rPr lang="en-US" dirty="0"/>
-              <a:t> cannot work with user entity on any REST CRUD </a:t>
-            </a:r>
-            <a:r>
-              <a:rPr lang="en-US" dirty="0" err="1"/>
-              <a:t>Optn</a:t>
-            </a:r>
-            <a:endParaRPr lang="en-US" dirty="0"/>
-          </a:p>
-          <a:p>
-            <a:pPr marL="285750" indent="-285750">
-              <a:buFontTx/>
-              <a:buChar char="-"/>
-            </a:pPr>
-            <a:endParaRPr lang="en-US" dirty="0"/>
-          </a:p>
-          <a:p>
-            <a:pPr marL="285750" indent="-285750">
-              <a:buFontTx/>
-              <a:buChar char="-"/>
-            </a:pPr>
-            <a:endParaRPr lang="en-US" dirty="0"/>
-          </a:p>
-          <a:p>
-            <a:r>
-              <a:rPr lang="en-US" dirty="0"/>
-              <a:t>2) Why Action/API Endpoint method returns </a:t>
-            </a:r>
-            <a:r>
-              <a:rPr lang="en-US" dirty="0" err="1"/>
-              <a:t>ActionResult</a:t>
-            </a:r>
-            <a:r>
-              <a:rPr lang="en-US" dirty="0"/>
-              <a:t> not the object directly?</a:t>
-            </a:r>
-          </a:p>
-          <a:p>
-            <a:endParaRPr lang="en-US" dirty="0"/>
-          </a:p>
-          <a:p>
-            <a:endParaRPr lang="en-US" dirty="0"/>
+        </p:txBody>
+      </p:sp>
+      <p:pic>
+        <p:nvPicPr>
+          <p:cNvPr id="4" name="Picture 3">
+            <a:extLst>
+              <a:ext uri="{FF2B5EF4-FFF2-40B4-BE49-F238E27FC236}">
+                <a16:creationId xmlns:a16="http://schemas.microsoft.com/office/drawing/2014/main" id="{AED4EA20-BD09-DB55-A9D6-EA8745F793D7}"/>
+              </a:ext>
+            </a:extLst>
+          </p:cNvPr>
+          <p:cNvPicPr>
+            <a:picLocks noChangeAspect="1"/>
+          </p:cNvPicPr>
+          <p:nvPr/>
+        </p:nvPicPr>
+        <p:blipFill>
+          <a:blip r:embed="rId2"/>
+          <a:stretch>
+            <a:fillRect/>
+          </a:stretch>
+        </p:blipFill>
+        <p:spPr>
+          <a:xfrm>
+            <a:off x="304325" y="736831"/>
+            <a:ext cx="3725808" cy="2288850"/>
+          </a:xfrm>
+          <a:prstGeom prst="rect">
+            <a:avLst/>
+          </a:prstGeom>
+        </p:spPr>
+      </p:pic>
+      <p:pic>
+        <p:nvPicPr>
+          <p:cNvPr id="6" name="Picture 5">
+            <a:extLst>
+              <a:ext uri="{FF2B5EF4-FFF2-40B4-BE49-F238E27FC236}">
+                <a16:creationId xmlns:a16="http://schemas.microsoft.com/office/drawing/2014/main" id="{A5F4CAC1-B375-8F12-4FA6-11AB22BD97B8}"/>
+              </a:ext>
+            </a:extLst>
+          </p:cNvPr>
+          <p:cNvPicPr>
+            <a:picLocks noChangeAspect="1"/>
+          </p:cNvPicPr>
+          <p:nvPr/>
+        </p:nvPicPr>
+        <p:blipFill>
+          <a:blip r:embed="rId3"/>
+          <a:stretch>
+            <a:fillRect/>
+          </a:stretch>
+        </p:blipFill>
+        <p:spPr>
+          <a:xfrm>
+            <a:off x="5202599" y="316492"/>
+            <a:ext cx="5486739" cy="2463634"/>
+          </a:xfrm>
+          <a:prstGeom prst="rect">
+            <a:avLst/>
+          </a:prstGeom>
+        </p:spPr>
+      </p:pic>
+      <p:sp>
+        <p:nvSpPr>
+          <p:cNvPr id="7" name="Arrow: Right 6">
+            <a:extLst>
+              <a:ext uri="{FF2B5EF4-FFF2-40B4-BE49-F238E27FC236}">
+                <a16:creationId xmlns:a16="http://schemas.microsoft.com/office/drawing/2014/main" id="{80FF5E4A-E6E6-C95F-3FD6-64E20EDB81BA}"/>
+              </a:ext>
+            </a:extLst>
+          </p:cNvPr>
+          <p:cNvSpPr/>
+          <p:nvPr/>
+        </p:nvSpPr>
+        <p:spPr>
+          <a:xfrm>
+            <a:off x="4182748" y="906494"/>
+            <a:ext cx="762000" cy="482600"/>
+          </a:xfrm>
+          <a:prstGeom prst="rightArrow">
+            <a:avLst/>
+          </a:prstGeom>
+        </p:spPr>
+        <p:style>
+          <a:lnRef idx="2">
+            <a:schemeClr val="accent1">
+              <a:shade val="50000"/>
+            </a:schemeClr>
+          </a:lnRef>
+          <a:fillRef idx="1">
+            <a:schemeClr val="accent1"/>
+          </a:fillRef>
+          <a:effectRef idx="0">
+            <a:schemeClr val="accent1"/>
+          </a:effectRef>
+          <a:fontRef idx="minor">
+            <a:schemeClr val="lt1"/>
+          </a:fontRef>
+        </p:style>
+        <p:txBody>
+          <a:bodyPr rtlCol="0" anchor="ctr"/>
+          <a:lstStyle/>
+          <a:p>
+            <a:pPr algn="ctr"/>
+            <a:endParaRPr lang="en-US"/>
+          </a:p>
+        </p:txBody>
+      </p:sp>
+      <p:sp>
+        <p:nvSpPr>
+          <p:cNvPr id="8" name="Arrow: Down 7">
+            <a:extLst>
+              <a:ext uri="{FF2B5EF4-FFF2-40B4-BE49-F238E27FC236}">
+                <a16:creationId xmlns:a16="http://schemas.microsoft.com/office/drawing/2014/main" id="{82BF588C-24A6-566B-9A42-19A92E087C2E}"/>
+              </a:ext>
+            </a:extLst>
+          </p:cNvPr>
+          <p:cNvSpPr/>
+          <p:nvPr/>
+        </p:nvSpPr>
+        <p:spPr>
+          <a:xfrm>
+            <a:off x="7425267" y="2834151"/>
+            <a:ext cx="296333" cy="442449"/>
+          </a:xfrm>
+          <a:prstGeom prst="downArrow">
+            <a:avLst/>
+          </a:prstGeom>
+        </p:spPr>
+        <p:style>
+          <a:lnRef idx="2">
+            <a:schemeClr val="accent1">
+              <a:shade val="50000"/>
+            </a:schemeClr>
+          </a:lnRef>
+          <a:fillRef idx="1">
+            <a:schemeClr val="accent1"/>
+          </a:fillRef>
+          <a:effectRef idx="0">
+            <a:schemeClr val="accent1"/>
+          </a:effectRef>
+          <a:fontRef idx="minor">
+            <a:schemeClr val="lt1"/>
+          </a:fontRef>
+        </p:style>
+        <p:txBody>
+          <a:bodyPr rtlCol="0" anchor="ctr"/>
+          <a:lstStyle/>
+          <a:p>
+            <a:pPr algn="ctr"/>
+            <a:endParaRPr lang="en-US"/>
+          </a:p>
+        </p:txBody>
+      </p:sp>
+      <p:sp>
+        <p:nvSpPr>
+          <p:cNvPr id="9" name="TextBox 8">
+            <a:extLst>
+              <a:ext uri="{FF2B5EF4-FFF2-40B4-BE49-F238E27FC236}">
+                <a16:creationId xmlns:a16="http://schemas.microsoft.com/office/drawing/2014/main" id="{0AD618F5-967B-1BF0-ECE4-CCFC21C7B2A2}"/>
+              </a:ext>
+            </a:extLst>
+          </p:cNvPr>
+          <p:cNvSpPr txBox="1"/>
+          <p:nvPr/>
+        </p:nvSpPr>
+        <p:spPr>
+          <a:xfrm>
+            <a:off x="7721600" y="2907268"/>
+            <a:ext cx="1955800" cy="369332"/>
+          </a:xfrm>
+          <a:prstGeom prst="rect">
+            <a:avLst/>
+          </a:prstGeom>
+          <a:noFill/>
+        </p:spPr>
+        <p:txBody>
+          <a:bodyPr wrap="square" rtlCol="0">
+            <a:spAutoFit/>
+          </a:bodyPr>
+          <a:lstStyle/>
+          <a:p>
+            <a:r>
+              <a:rPr lang="en-US" dirty="0"/>
+              <a:t>Solution - DTO</a:t>
+            </a:r>
+          </a:p>
+        </p:txBody>
+      </p:sp>
+      <p:pic>
+        <p:nvPicPr>
+          <p:cNvPr id="11" name="Picture 10">
+            <a:extLst>
+              <a:ext uri="{FF2B5EF4-FFF2-40B4-BE49-F238E27FC236}">
+                <a16:creationId xmlns:a16="http://schemas.microsoft.com/office/drawing/2014/main" id="{CF43F165-0DA0-CAA8-349A-12BFDBCB5EC9}"/>
+              </a:ext>
+            </a:extLst>
+          </p:cNvPr>
+          <p:cNvPicPr>
+            <a:picLocks noChangeAspect="1"/>
+          </p:cNvPicPr>
+          <p:nvPr/>
+        </p:nvPicPr>
+        <p:blipFill>
+          <a:blip r:embed="rId4"/>
+          <a:stretch>
+            <a:fillRect/>
+          </a:stretch>
+        </p:blipFill>
+        <p:spPr>
+          <a:xfrm>
+            <a:off x="5427663" y="3581401"/>
+            <a:ext cx="5037137" cy="2672029"/>
+          </a:xfrm>
+          <a:prstGeom prst="rect">
+            <a:avLst/>
+          </a:prstGeom>
+        </p:spPr>
+      </p:pic>
+      <p:sp>
+        <p:nvSpPr>
+          <p:cNvPr id="12" name="TextBox 11">
+            <a:extLst>
+              <a:ext uri="{FF2B5EF4-FFF2-40B4-BE49-F238E27FC236}">
+                <a16:creationId xmlns:a16="http://schemas.microsoft.com/office/drawing/2014/main" id="{C7E531DA-E6B2-51C8-B1DD-64DAB62A8E47}"/>
+              </a:ext>
+            </a:extLst>
+          </p:cNvPr>
+          <p:cNvSpPr txBox="1"/>
+          <p:nvPr/>
+        </p:nvSpPr>
+        <p:spPr>
+          <a:xfrm>
+            <a:off x="5799666" y="6242310"/>
+            <a:ext cx="4123267" cy="646331"/>
+          </a:xfrm>
+          <a:prstGeom prst="rect">
+            <a:avLst/>
+          </a:prstGeom>
+          <a:noFill/>
+        </p:spPr>
+        <p:txBody>
+          <a:bodyPr wrap="square" rtlCol="0">
+            <a:spAutoFit/>
+          </a:bodyPr>
+          <a:lstStyle/>
+          <a:p>
+            <a:r>
+              <a:rPr lang="en-US" dirty="0"/>
+              <a:t>DTO can skip Platform which is not required to the customer..</a:t>
+            </a:r>
           </a:p>
         </p:txBody>
       </p:sp>
     </p:spTree>
     <p:extLst>
       <p:ext uri="{BB962C8B-B14F-4D97-AF65-F5344CB8AC3E}">
-        <p14:creationId xmlns:p14="http://schemas.microsoft.com/office/powerpoint/2010/main" val="2802120370"/>
+        <p14:creationId xmlns:p14="http://schemas.microsoft.com/office/powerpoint/2010/main" val="3839042300"/>
       </p:ext>
     </p:extLst>
   </p:cSld>
@@ -4556,161 +4873,229 @@
           <a:chExt cx="0" cy="0"/>
         </a:xfrm>
       </p:grpSpPr>
-      <p:sp>
-        <p:nvSpPr>
-          <p:cNvPr id="2" name="Title 1">
-            <a:extLst>
-              <a:ext uri="{FF2B5EF4-FFF2-40B4-BE49-F238E27FC236}">
-                <a16:creationId xmlns:a16="http://schemas.microsoft.com/office/drawing/2014/main" id="{7E26196B-6402-0E4D-8DED-007E9EAE3FD8}"/>
-              </a:ext>
-            </a:extLst>
-          </p:cNvPr>
-          <p:cNvSpPr>
-            <a:spLocks noGrp="1"/>
-          </p:cNvSpPr>
-          <p:nvPr>
-            <p:ph type="title"/>
-          </p:nvPr>
-        </p:nvSpPr>
+      <p:pic>
+        <p:nvPicPr>
+          <p:cNvPr id="3" name="Picture 2">
+            <a:extLst>
+              <a:ext uri="{FF2B5EF4-FFF2-40B4-BE49-F238E27FC236}">
+                <a16:creationId xmlns:a16="http://schemas.microsoft.com/office/drawing/2014/main" id="{661E7434-0220-98D6-9B65-DC2DE5ABB2A1}"/>
+              </a:ext>
+            </a:extLst>
+          </p:cNvPr>
+          <p:cNvPicPr>
+            <a:picLocks noChangeAspect="1"/>
+          </p:cNvPicPr>
+          <p:nvPr/>
+        </p:nvPicPr>
+        <p:blipFill>
+          <a:blip r:embed="rId2"/>
+          <a:stretch>
+            <a:fillRect/>
+          </a:stretch>
+        </p:blipFill>
         <p:spPr>
           <a:xfrm>
-            <a:off x="838200" y="154005"/>
-            <a:ext cx="10515600" cy="760396"/>
+            <a:off x="857250" y="733425"/>
+            <a:ext cx="10477500" cy="5391150"/>
           </a:xfrm>
+          <a:prstGeom prst="rect">
+            <a:avLst/>
+          </a:prstGeom>
         </p:spPr>
-        <p:txBody>
-          <a:bodyPr>
-            <a:normAutofit/>
-          </a:bodyPr>
-          <a:lstStyle/>
-          <a:p>
-            <a:r>
-              <a:rPr lang="en-US" dirty="0"/>
-              <a:t>Create project vs code </a:t>
-            </a:r>
-            <a:r>
-              <a:rPr lang="en-US" dirty="0" err="1"/>
-              <a:t>Cmdj</a:t>
-            </a:r>
-            <a:endParaRPr lang="en-US" dirty="0"/>
-          </a:p>
-        </p:txBody>
-      </p:sp>
-      <p:sp>
-        <p:nvSpPr>
-          <p:cNvPr id="3" name="Content Placeholder 2">
-            <a:extLst>
-              <a:ext uri="{FF2B5EF4-FFF2-40B4-BE49-F238E27FC236}">
-                <a16:creationId xmlns:a16="http://schemas.microsoft.com/office/drawing/2014/main" id="{2F6146CC-94B4-88A0-BF12-87FF6547995E}"/>
-              </a:ext>
-            </a:extLst>
-          </p:cNvPr>
-          <p:cNvSpPr>
-            <a:spLocks noGrp="1"/>
-          </p:cNvSpPr>
-          <p:nvPr>
-            <p:ph idx="1"/>
-          </p:nvPr>
-        </p:nvSpPr>
-        <p:spPr>
-          <a:xfrm>
-            <a:off x="838200" y="991402"/>
-            <a:ext cx="10515600" cy="5185561"/>
-          </a:xfrm>
-        </p:spPr>
-        <p:txBody>
-          <a:bodyPr/>
-          <a:lstStyle/>
-          <a:p>
-            <a:pPr marL="0" indent="0">
-              <a:buNone/>
-            </a:pPr>
-            <a:r>
-              <a:rPr lang="en-US" dirty="0" err="1"/>
-              <a:t>Cmds</a:t>
-            </a:r>
-            <a:r>
-              <a:rPr lang="en-US" dirty="0"/>
-              <a:t>:</a:t>
-            </a:r>
-          </a:p>
-          <a:p>
-            <a:pPr marL="0" indent="0">
-              <a:buNone/>
-            </a:pPr>
-            <a:endParaRPr lang="en-US" dirty="0"/>
-          </a:p>
-          <a:p>
-            <a:pPr marL="0" indent="0">
-              <a:buNone/>
-            </a:pPr>
-            <a:r>
-              <a:rPr lang="en-US" dirty="0"/>
-              <a:t>Dotnet new</a:t>
-            </a:r>
-          </a:p>
-          <a:p>
-            <a:pPr marL="0" indent="0">
-              <a:buNone/>
-            </a:pPr>
-            <a:r>
-              <a:rPr lang="en-US" dirty="0"/>
-              <a:t>Dotnet new </a:t>
-            </a:r>
-            <a:r>
-              <a:rPr lang="en-US" dirty="0" err="1"/>
-              <a:t>webapi</a:t>
-            </a:r>
-            <a:r>
-              <a:rPr lang="en-US" dirty="0"/>
-              <a:t> –n </a:t>
-            </a:r>
-            <a:r>
-              <a:rPr lang="en-US" dirty="0" err="1"/>
-              <a:t>commandServer</a:t>
-            </a:r>
-            <a:r>
-              <a:rPr lang="en-US" dirty="0"/>
-              <a:t> (name of project)</a:t>
-            </a:r>
-          </a:p>
-          <a:p>
-            <a:pPr marL="0" indent="0">
-              <a:buNone/>
-            </a:pPr>
-            <a:endParaRPr lang="en-US" dirty="0"/>
-          </a:p>
-          <a:p>
-            <a:pPr marL="0" indent="0">
-              <a:buNone/>
-            </a:pPr>
-            <a:r>
-              <a:rPr lang="en-US" dirty="0"/>
-              <a:t>Core –r </a:t>
-            </a:r>
-            <a:r>
-              <a:rPr lang="en-US" dirty="0" err="1"/>
-              <a:t>commandServer</a:t>
-            </a:r>
-            <a:r>
-              <a:rPr lang="en-US" dirty="0"/>
-              <a:t> – open folder in </a:t>
-            </a:r>
-            <a:r>
-              <a:rPr lang="en-US" dirty="0" err="1"/>
-              <a:t>vscode</a:t>
-            </a:r>
-            <a:r>
-              <a:rPr lang="en-US" dirty="0"/>
-              <a:t> ?</a:t>
-            </a:r>
-          </a:p>
-        </p:txBody>
-      </p:sp>
+      </p:pic>
     </p:spTree>
     <p:extLst>
       <p:ext uri="{BB962C8B-B14F-4D97-AF65-F5344CB8AC3E}">
-        <p14:creationId xmlns:p14="http://schemas.microsoft.com/office/powerpoint/2010/main" val="177991174"/>
+        <p14:creationId xmlns:p14="http://schemas.microsoft.com/office/powerpoint/2010/main" val="1154470495"/>
+      </p:ext>
+    </p:extLst>
+  </p:cSld>
+  <p:clrMapOvr>
+    <a:masterClrMapping/>
+  </p:clrMapOvr>
+</p:sld>
+</file>
+
+<file path=ppt/slides/slide9.xml><?xml version="1.0" encoding="utf-8"?>
+<p:sld xmlns:a="http://schemas.openxmlformats.org/drawingml/2006/main" xmlns:r="http://schemas.openxmlformats.org/officeDocument/2006/relationships" xmlns:p="http://schemas.openxmlformats.org/presentationml/2006/main">
+  <p:cSld>
+    <p:spTree>
+      <p:nvGrpSpPr>
+        <p:cNvPr id="1" name=""/>
+        <p:cNvGrpSpPr/>
+        <p:nvPr/>
+      </p:nvGrpSpPr>
+      <p:grpSpPr>
+        <a:xfrm>
+          <a:off x="0" y="0"/>
+          <a:ext cx="0" cy="0"/>
+          <a:chOff x="0" y="0"/>
+          <a:chExt cx="0" cy="0"/>
+        </a:xfrm>
+      </p:grpSpPr>
+      <p:sp>
+        <p:nvSpPr>
+          <p:cNvPr id="3" name="TextBox 2">
+            <a:extLst>
+              <a:ext uri="{FF2B5EF4-FFF2-40B4-BE49-F238E27FC236}">
+                <a16:creationId xmlns:a16="http://schemas.microsoft.com/office/drawing/2014/main" id="{52F8B9B6-1779-AE32-DA41-7B7F606DA714}"/>
+              </a:ext>
+            </a:extLst>
+          </p:cNvPr>
+          <p:cNvSpPr txBox="1"/>
+          <p:nvPr/>
+        </p:nvSpPr>
+        <p:spPr>
+          <a:xfrm>
+            <a:off x="304800" y="296333"/>
+            <a:ext cx="11667067" cy="4247317"/>
+          </a:xfrm>
+          <a:prstGeom prst="rect">
+            <a:avLst/>
+          </a:prstGeom>
+          <a:noFill/>
+        </p:spPr>
+        <p:txBody>
+          <a:bodyPr wrap="square" rtlCol="0">
+            <a:spAutoFit/>
+          </a:bodyPr>
+          <a:lstStyle/>
+          <a:p>
+            <a:endParaRPr lang="en-US" dirty="0"/>
+          </a:p>
+          <a:p>
+            <a:r>
+              <a:rPr lang="en-US" dirty="0"/>
+              <a:t>1) How a controller deals with data?</a:t>
+            </a:r>
+          </a:p>
+          <a:p>
+            <a:endParaRPr lang="en-US" dirty="0"/>
+          </a:p>
+          <a:p>
+            <a:r>
+              <a:rPr lang="en-US" dirty="0"/>
+              <a:t>Controller gets the data it deals from repository.</a:t>
+            </a:r>
+          </a:p>
+          <a:p>
+            <a:endParaRPr lang="en-US" dirty="0"/>
+          </a:p>
+          <a:p>
+            <a:pPr marL="285750" indent="-285750">
+              <a:buFontTx/>
+              <a:buChar char="-"/>
+            </a:pPr>
+            <a:r>
+              <a:rPr lang="en-US" dirty="0"/>
+              <a:t>Repo(repository interface) can be for all resources. </a:t>
+            </a:r>
+            <a:r>
+              <a:rPr lang="en-US" dirty="0" err="1"/>
+              <a:t>i.e</a:t>
+            </a:r>
+            <a:r>
+              <a:rPr lang="en-US" dirty="0"/>
+              <a:t>, A Repo can return commands as well any other data the underlying data base supports.</a:t>
+            </a:r>
+          </a:p>
+          <a:p>
+            <a:pPr marL="285750" indent="-285750">
+              <a:buFontTx/>
+              <a:buChar char="-"/>
+            </a:pPr>
+            <a:r>
+              <a:rPr lang="en-US" dirty="0"/>
+              <a:t>Controller – can deal with one resource type. </a:t>
+            </a:r>
+            <a:r>
+              <a:rPr lang="en-US" dirty="0" err="1"/>
+              <a:t>i.e</a:t>
+            </a:r>
+            <a:r>
+              <a:rPr lang="en-US" dirty="0"/>
+              <a:t>, </a:t>
+            </a:r>
+            <a:r>
+              <a:rPr lang="en-US" dirty="0" err="1"/>
+              <a:t>Cmd</a:t>
+            </a:r>
+            <a:r>
+              <a:rPr lang="en-US" dirty="0"/>
+              <a:t> Controller can do CRUD operation on Cmd.</a:t>
+            </a:r>
+          </a:p>
+          <a:p>
+            <a:r>
+              <a:rPr lang="en-US" dirty="0" err="1"/>
+              <a:t>UserController</a:t>
+            </a:r>
+            <a:r>
+              <a:rPr lang="en-US" dirty="0"/>
+              <a:t> – can do CRUD Operation on User entity. </a:t>
+            </a:r>
+            <a:r>
+              <a:rPr lang="en-US" dirty="0" err="1"/>
+              <a:t>i.e</a:t>
+            </a:r>
+            <a:r>
+              <a:rPr lang="en-US" dirty="0"/>
+              <a:t>, </a:t>
+            </a:r>
+            <a:r>
+              <a:rPr lang="en-US" dirty="0" err="1"/>
+              <a:t>CmdController</a:t>
+            </a:r>
+            <a:r>
+              <a:rPr lang="en-US" dirty="0"/>
+              <a:t> cannot work with user entity on any REST CRUD </a:t>
+            </a:r>
+            <a:r>
+              <a:rPr lang="en-US" dirty="0" err="1"/>
+              <a:t>Optn</a:t>
+            </a:r>
+            <a:endParaRPr lang="en-US" dirty="0"/>
+          </a:p>
+          <a:p>
+            <a:pPr marL="285750" indent="-285750">
+              <a:buFontTx/>
+              <a:buChar char="-"/>
+            </a:pPr>
+            <a:endParaRPr lang="en-US" dirty="0"/>
+          </a:p>
+          <a:p>
+            <a:pPr marL="285750" indent="-285750">
+              <a:buFontTx/>
+              <a:buChar char="-"/>
+            </a:pPr>
+            <a:endParaRPr lang="en-US" dirty="0"/>
+          </a:p>
+          <a:p>
+            <a:r>
+              <a:rPr lang="en-US" dirty="0"/>
+              <a:t>2) Why Action/API Endpoint method returns </a:t>
+            </a:r>
+            <a:r>
+              <a:rPr lang="en-US" dirty="0" err="1"/>
+              <a:t>ActionResult</a:t>
+            </a:r>
+            <a:r>
+              <a:rPr lang="en-US" dirty="0"/>
+              <a:t> not the object directly?</a:t>
+            </a:r>
+          </a:p>
+          <a:p>
+            <a:endParaRPr lang="en-US" dirty="0"/>
+          </a:p>
+          <a:p>
+            <a:endParaRPr lang="en-US" dirty="0"/>
+          </a:p>
+        </p:txBody>
+      </p:sp>
+    </p:spTree>
+    <p:extLst>
+      <p:ext uri="{BB962C8B-B14F-4D97-AF65-F5344CB8AC3E}">
+        <p14:creationId xmlns:p14="http://schemas.microsoft.com/office/powerpoint/2010/main" val="2802120370"/>
       </p:ext>
     </p:extLst>
   </p:cSld>

</xml_diff>